<commit_message>
fixed order of images in paper
</commit_message>
<xml_diff>
--- a/paper/images/images.pptx
+++ b/paper/images/images.pptx
@@ -197,7 +197,7 @@
           <a:p>
             <a:fld id="{5A27FBCC-FB8B-4E3F-B0DB-E6CF72579A33}" type="datetimeFigureOut">
               <a:rPr lang="en-US" smtClean="0"/>
-              <a:t>3/7/2014</a:t>
+              <a:t>1/29/2015</a:t>
             </a:fld>
             <a:endParaRPr lang="en-US"/>
           </a:p>
@@ -646,7 +646,7 @@
           <a:p>
             <a:fld id="{74E2AFB1-44FA-4B2E-A4A2-D5E551A12BE2}" type="datetimeFigureOut">
               <a:rPr lang="en-US" smtClean="0"/>
-              <a:t>3/7/2014</a:t>
+              <a:t>1/29/2015</a:t>
             </a:fld>
             <a:endParaRPr lang="en-US"/>
           </a:p>
@@ -816,7 +816,7 @@
           <a:p>
             <a:fld id="{74E2AFB1-44FA-4B2E-A4A2-D5E551A12BE2}" type="datetimeFigureOut">
               <a:rPr lang="en-US" smtClean="0"/>
-              <a:t>3/7/2014</a:t>
+              <a:t>1/29/2015</a:t>
             </a:fld>
             <a:endParaRPr lang="en-US"/>
           </a:p>
@@ -996,7 +996,7 @@
           <a:p>
             <a:fld id="{74E2AFB1-44FA-4B2E-A4A2-D5E551A12BE2}" type="datetimeFigureOut">
               <a:rPr lang="en-US" smtClean="0"/>
-              <a:t>3/7/2014</a:t>
+              <a:t>1/29/2015</a:t>
             </a:fld>
             <a:endParaRPr lang="en-US"/>
           </a:p>
@@ -1166,7 +1166,7 @@
           <a:p>
             <a:fld id="{74E2AFB1-44FA-4B2E-A4A2-D5E551A12BE2}" type="datetimeFigureOut">
               <a:rPr lang="en-US" smtClean="0"/>
-              <a:t>3/7/2014</a:t>
+              <a:t>1/29/2015</a:t>
             </a:fld>
             <a:endParaRPr lang="en-US"/>
           </a:p>
@@ -1412,7 +1412,7 @@
           <a:p>
             <a:fld id="{74E2AFB1-44FA-4B2E-A4A2-D5E551A12BE2}" type="datetimeFigureOut">
               <a:rPr lang="en-US" smtClean="0"/>
-              <a:t>3/7/2014</a:t>
+              <a:t>1/29/2015</a:t>
             </a:fld>
             <a:endParaRPr lang="en-US"/>
           </a:p>
@@ -1700,7 +1700,7 @@
           <a:p>
             <a:fld id="{74E2AFB1-44FA-4B2E-A4A2-D5E551A12BE2}" type="datetimeFigureOut">
               <a:rPr lang="en-US" smtClean="0"/>
-              <a:t>3/7/2014</a:t>
+              <a:t>1/29/2015</a:t>
             </a:fld>
             <a:endParaRPr lang="en-US"/>
           </a:p>
@@ -2122,7 +2122,7 @@
           <a:p>
             <a:fld id="{74E2AFB1-44FA-4B2E-A4A2-D5E551A12BE2}" type="datetimeFigureOut">
               <a:rPr lang="en-US" smtClean="0"/>
-              <a:t>3/7/2014</a:t>
+              <a:t>1/29/2015</a:t>
             </a:fld>
             <a:endParaRPr lang="en-US"/>
           </a:p>
@@ -2240,7 +2240,7 @@
           <a:p>
             <a:fld id="{74E2AFB1-44FA-4B2E-A4A2-D5E551A12BE2}" type="datetimeFigureOut">
               <a:rPr lang="en-US" smtClean="0"/>
-              <a:t>3/7/2014</a:t>
+              <a:t>1/29/2015</a:t>
             </a:fld>
             <a:endParaRPr lang="en-US"/>
           </a:p>
@@ -2335,7 +2335,7 @@
           <a:p>
             <a:fld id="{74E2AFB1-44FA-4B2E-A4A2-D5E551A12BE2}" type="datetimeFigureOut">
               <a:rPr lang="en-US" smtClean="0"/>
-              <a:t>3/7/2014</a:t>
+              <a:t>1/29/2015</a:t>
             </a:fld>
             <a:endParaRPr lang="en-US"/>
           </a:p>
@@ -2612,7 +2612,7 @@
           <a:p>
             <a:fld id="{74E2AFB1-44FA-4B2E-A4A2-D5E551A12BE2}" type="datetimeFigureOut">
               <a:rPr lang="en-US" smtClean="0"/>
-              <a:t>3/7/2014</a:t>
+              <a:t>1/29/2015</a:t>
             </a:fld>
             <a:endParaRPr lang="en-US"/>
           </a:p>
@@ -2865,7 +2865,7 @@
           <a:p>
             <a:fld id="{74E2AFB1-44FA-4B2E-A4A2-D5E551A12BE2}" type="datetimeFigureOut">
               <a:rPr lang="en-US" smtClean="0"/>
-              <a:t>3/7/2014</a:t>
+              <a:t>1/29/2015</a:t>
             </a:fld>
             <a:endParaRPr lang="en-US"/>
           </a:p>
@@ -3078,7 +3078,7 @@
           <a:p>
             <a:fld id="{74E2AFB1-44FA-4B2E-A4A2-D5E551A12BE2}" type="datetimeFigureOut">
               <a:rPr lang="en-US" smtClean="0"/>
-              <a:t>3/7/2014</a:t>
+              <a:t>1/29/2015</a:t>
             </a:fld>
             <a:endParaRPr lang="en-US"/>
           </a:p>
@@ -4266,11 +4266,18 @@
           <a:lstStyle/>
           <a:p>
             <a:r>
+              <a:rPr lang="en-US" sz="1100" dirty="0" err="1" smtClean="0">
+                <a:latin typeface="+mj-lt"/>
+                <a:cs typeface="Arial" panose="020B0604020202020204" pitchFamily="34" charset="0"/>
+              </a:rPr>
+              <a:t>Urbanicity</a:t>
+            </a:r>
+            <a:r>
               <a:rPr lang="en-US" sz="1100" dirty="0" smtClean="0">
                 <a:latin typeface="+mj-lt"/>
                 <a:cs typeface="Arial" panose="020B0604020202020204" pitchFamily="34" charset="0"/>
               </a:rPr>
-              <a:t>Region Selection</a:t>
+              <a:t> Selection</a:t>
             </a:r>
             <a:endParaRPr lang="en-US" sz="1100" dirty="0">
               <a:latin typeface="+mj-lt"/>
@@ -4306,21 +4313,7 @@
                 <a:latin typeface="+mj-lt"/>
                 <a:cs typeface="Arial" panose="020B0604020202020204" pitchFamily="34" charset="0"/>
               </a:rPr>
-              <a:t>Urbanicity </a:t>
-            </a:r>
-            <a:r>
-              <a:rPr lang="en-US" sz="1100" dirty="0">
-                <a:latin typeface="+mj-lt"/>
-                <a:cs typeface="Arial" panose="020B0604020202020204" pitchFamily="34" charset="0"/>
-              </a:rPr>
-              <a:t>S</a:t>
-            </a:r>
-            <a:r>
-              <a:rPr lang="en-US" sz="1100" dirty="0" smtClean="0">
-                <a:latin typeface="+mj-lt"/>
-                <a:cs typeface="Arial" panose="020B0604020202020204" pitchFamily="34" charset="0"/>
-              </a:rPr>
-              <a:t>election</a:t>
+              <a:t>Region Selection</a:t>
             </a:r>
             <a:endParaRPr lang="en-US" sz="1100" dirty="0">
               <a:latin typeface="+mj-lt"/>

</xml_diff>